<commit_message>
add projec plan and abstract
</commit_message>
<xml_diff>
--- a/2017-04-07383/Laundry M system discripto.pptx
+++ b/2017-04-07383/Laundry M system discripto.pptx
@@ -244,7 +244,7 @@
           <a:p>
             <a:fld id="{F0EF960C-C48D-4FFB-A0E2-E83D3979E02F}" type="datetimeFigureOut">
               <a:rPr lang="en-US" smtClean="0"/>
-              <a:t>4/4/2019</a:t>
+              <a:t>4/11/2019</a:t>
             </a:fld>
             <a:endParaRPr lang="en-US"/>
           </a:p>
@@ -414,7 +414,7 @@
           <a:p>
             <a:fld id="{F0EF960C-C48D-4FFB-A0E2-E83D3979E02F}" type="datetimeFigureOut">
               <a:rPr lang="en-US" smtClean="0"/>
-              <a:t>4/4/2019</a:t>
+              <a:t>4/11/2019</a:t>
             </a:fld>
             <a:endParaRPr lang="en-US"/>
           </a:p>
@@ -594,7 +594,7 @@
           <a:p>
             <a:fld id="{F0EF960C-C48D-4FFB-A0E2-E83D3979E02F}" type="datetimeFigureOut">
               <a:rPr lang="en-US" smtClean="0"/>
-              <a:t>4/4/2019</a:t>
+              <a:t>4/11/2019</a:t>
             </a:fld>
             <a:endParaRPr lang="en-US"/>
           </a:p>
@@ -764,7 +764,7 @@
           <a:p>
             <a:fld id="{F0EF960C-C48D-4FFB-A0E2-E83D3979E02F}" type="datetimeFigureOut">
               <a:rPr lang="en-US" smtClean="0"/>
-              <a:t>4/4/2019</a:t>
+              <a:t>4/11/2019</a:t>
             </a:fld>
             <a:endParaRPr lang="en-US"/>
           </a:p>
@@ -1010,7 +1010,7 @@
           <a:p>
             <a:fld id="{F0EF960C-C48D-4FFB-A0E2-E83D3979E02F}" type="datetimeFigureOut">
               <a:rPr lang="en-US" smtClean="0"/>
-              <a:t>4/4/2019</a:t>
+              <a:t>4/11/2019</a:t>
             </a:fld>
             <a:endParaRPr lang="en-US"/>
           </a:p>
@@ -1242,7 +1242,7 @@
           <a:p>
             <a:fld id="{F0EF960C-C48D-4FFB-A0E2-E83D3979E02F}" type="datetimeFigureOut">
               <a:rPr lang="en-US" smtClean="0"/>
-              <a:t>4/4/2019</a:t>
+              <a:t>4/11/2019</a:t>
             </a:fld>
             <a:endParaRPr lang="en-US"/>
           </a:p>
@@ -1609,7 +1609,7 @@
           <a:p>
             <a:fld id="{F0EF960C-C48D-4FFB-A0E2-E83D3979E02F}" type="datetimeFigureOut">
               <a:rPr lang="en-US" smtClean="0"/>
-              <a:t>4/4/2019</a:t>
+              <a:t>4/11/2019</a:t>
             </a:fld>
             <a:endParaRPr lang="en-US"/>
           </a:p>
@@ -1727,7 +1727,7 @@
           <a:p>
             <a:fld id="{F0EF960C-C48D-4FFB-A0E2-E83D3979E02F}" type="datetimeFigureOut">
               <a:rPr lang="en-US" smtClean="0"/>
-              <a:t>4/4/2019</a:t>
+              <a:t>4/11/2019</a:t>
             </a:fld>
             <a:endParaRPr lang="en-US"/>
           </a:p>
@@ -1822,7 +1822,7 @@
           <a:p>
             <a:fld id="{F0EF960C-C48D-4FFB-A0E2-E83D3979E02F}" type="datetimeFigureOut">
               <a:rPr lang="en-US" smtClean="0"/>
-              <a:t>4/4/2019</a:t>
+              <a:t>4/11/2019</a:t>
             </a:fld>
             <a:endParaRPr lang="en-US"/>
           </a:p>
@@ -2099,7 +2099,7 @@
           <a:p>
             <a:fld id="{F0EF960C-C48D-4FFB-A0E2-E83D3979E02F}" type="datetimeFigureOut">
               <a:rPr lang="en-US" smtClean="0"/>
-              <a:t>4/4/2019</a:t>
+              <a:t>4/11/2019</a:t>
             </a:fld>
             <a:endParaRPr lang="en-US"/>
           </a:p>
@@ -2352,7 +2352,7 @@
           <a:p>
             <a:fld id="{F0EF960C-C48D-4FFB-A0E2-E83D3979E02F}" type="datetimeFigureOut">
               <a:rPr lang="en-US" smtClean="0"/>
-              <a:t>4/4/2019</a:t>
+              <a:t>4/11/2019</a:t>
             </a:fld>
             <a:endParaRPr lang="en-US"/>
           </a:p>
@@ -2565,7 +2565,7 @@
           <a:p>
             <a:fld id="{F0EF960C-C48D-4FFB-A0E2-E83D3979E02F}" type="datetimeFigureOut">
               <a:rPr lang="en-US" smtClean="0"/>
-              <a:t>4/4/2019</a:t>
+              <a:t>4/11/2019</a:t>
             </a:fld>
             <a:endParaRPr lang="en-US"/>
           </a:p>
@@ -3071,7 +3071,7 @@
                   </a:outerShdw>
                 </a:effectLst>
               </a:rPr>
-              <a:t>Description </a:t>
+              <a:t>How the system will work</a:t>
             </a:r>
             <a:endParaRPr lang="en-US" dirty="0">
               <a:ln w="0"/>
@@ -3113,11 +3113,7 @@
             </a:pPr>
             <a:r>
               <a:rPr lang="en-US" sz="3200" dirty="0" smtClean="0"/>
-              <a:t>This is a system which will be used in a laundry work place to manage  the work done for example the order provided by the customers and the specific services provided by the company plus advertisement of their products though the system also keep in order the working staffs of the </a:t>
-            </a:r>
-            <a:r>
-              <a:rPr lang="en-US" sz="3200" dirty="0" smtClean="0"/>
-              <a:t>company</a:t>
+              <a:t>This is a system which will be used in a laundry work place to manage  the work done for example the order provided by the customers and the specific services provided by the company plus advertisement of their products though the system also keep in order the working staffs of the company</a:t>
             </a:r>
             <a:r>
               <a:rPr lang="en-US" sz="3200" dirty="0"/>
@@ -3127,7 +3123,6 @@
               <a:rPr lang="en-US" sz="3200" dirty="0" smtClean="0"/>
               <a:t>and their activity.</a:t>
             </a:r>
-            <a:endParaRPr lang="en-US" sz="3200" dirty="0" smtClean="0"/>
           </a:p>
         </p:txBody>
       </p:sp>

</xml_diff>